<commit_message>
Update the application icon
</commit_message>
<xml_diff>
--- a/.assets/Welcome.pptx
+++ b/.assets/Welcome.pptx
@@ -16,7 +16,7 @@
     <p:sldId id="283" r:id="rId4"/>
     <p:sldId id="282" r:id="rId5"/>
   </p:sldIdLst>
-  <p:sldSz cx="9144000" cy="6858000" type="screen4x3"/>
+  <p:sldSz cx="12192000" cy="6858000"/>
   <p:notesSz cx="6858000" cy="9144000"/>
   <p:defaultTextStyle>
     <a:defPPr>
@@ -141,7 +141,7 @@
             <a:srgbClr val="A4A3A4"/>
           </p15:clr>
         </p15:guide>
-        <p15:guide id="2" pos="2880" userDrawn="1">
+        <p15:guide id="2" pos="3840" userDrawn="1">
           <p15:clr>
             <a:srgbClr val="A4A3A4"/>
           </p15:clr>
@@ -243,7 +243,7 @@
           <a:p>
             <a:fld id="{80680FBE-A8DF-4758-9AC4-3A9E1039168F}" type="datetimeFigureOut">
               <a:rPr lang="en-US" smtClean="0"/>
-              <a:t>5/12/2020</a:t>
+              <a:t>3/18/2025</a:t>
             </a:fld>
             <a:endParaRPr lang="en-US"/>
           </a:p>
@@ -408,7 +408,7 @@
           <a:p>
             <a:fld id="{EC13577B-6902-467D-A26C-08A0DD5E4E03}" type="datetimeFigureOut">
               <a:rPr lang="en-US" smtClean="0"/>
-              <a:t>5/12/2020</a:t>
+              <a:t>3/18/2025</a:t>
             </a:fld>
             <a:endParaRPr lang="en-US"/>
           </a:p>
@@ -426,8 +426,8 @@
         </p:nvSpPr>
         <p:spPr>
           <a:xfrm>
-            <a:off x="1371600" y="1143000"/>
-            <a:ext cx="4114800" cy="3086100"/>
+            <a:off x="685800" y="1143000"/>
+            <a:ext cx="5486400" cy="3086100"/>
           </a:xfrm>
           <a:prstGeom prst="rect">
             <a:avLst/>
@@ -704,8 +704,8 @@
         </p:nvSpPr>
         <p:spPr>
           <a:xfrm>
-            <a:off x="1371600" y="1143000"/>
-            <a:ext cx="4114800" cy="3086100"/>
+            <a:off x="685800" y="1143000"/>
+            <a:ext cx="5486400" cy="3086100"/>
           </a:xfrm>
         </p:spPr>
       </p:sp>
@@ -793,8 +793,8 @@
         </p:nvSpPr>
         <p:spPr>
           <a:xfrm>
-            <a:off x="1371600" y="1143000"/>
-            <a:ext cx="4114800" cy="3086100"/>
+            <a:off x="685800" y="1143000"/>
+            <a:ext cx="5486400" cy="3086100"/>
           </a:xfrm>
         </p:spPr>
       </p:sp>
@@ -886,8 +886,8 @@
         </p:nvSpPr>
         <p:spPr bwMode="blackWhite">
           <a:xfrm>
-            <a:off x="191213" y="262785"/>
-            <a:ext cx="8761576" cy="6332433"/>
+            <a:off x="254951" y="262786"/>
+            <a:ext cx="11682101" cy="6332433"/>
           </a:xfrm>
           <a:prstGeom prst="rect">
             <a:avLst/>
@@ -985,8 +985,8 @@
         </p:nvSpPr>
         <p:spPr>
           <a:xfrm>
-            <a:off x="192024" y="265177"/>
-            <a:ext cx="8762287" cy="6332433"/>
+            <a:off x="256033" y="265177"/>
+            <a:ext cx="11683049" cy="6332433"/>
           </a:xfrm>
           <a:prstGeom prst="rect">
             <a:avLst/>
@@ -1031,8 +1031,8 @@
         </p:nvCxnSpPr>
         <p:spPr>
           <a:xfrm>
-            <a:off x="453326" y="1196392"/>
-            <a:ext cx="8237349" cy="0"/>
+            <a:off x="604435" y="1196392"/>
+            <a:ext cx="10983132" cy="0"/>
           </a:xfrm>
           <a:prstGeom prst="line">
             <a:avLst/>
@@ -1070,8 +1070,8 @@
         </p:nvSpPr>
         <p:spPr>
           <a:xfrm>
-            <a:off x="390906" y="448056"/>
-            <a:ext cx="5157839" cy="640080"/>
+            <a:off x="521209" y="448056"/>
+            <a:ext cx="6877119" cy="640080"/>
           </a:xfrm>
         </p:spPr>
         <p:txBody>
@@ -1110,8 +1110,8 @@
         </p:nvSpPr>
         <p:spPr>
           <a:xfrm>
-            <a:off x="404622" y="1435608"/>
-            <a:ext cx="3312414" cy="3977640"/>
+            <a:off x="539496" y="1435608"/>
+            <a:ext cx="4416552" cy="3977640"/>
           </a:xfrm>
         </p:spPr>
         <p:txBody>
@@ -1275,8 +1275,8 @@
         </p:nvSpPr>
         <p:spPr>
           <a:xfrm>
-            <a:off x="404622" y="6203953"/>
-            <a:ext cx="2457450" cy="365125"/>
+            <a:off x="539496" y="6203954"/>
+            <a:ext cx="3276600" cy="365125"/>
           </a:xfrm>
           <a:prstGeom prst="rect">
             <a:avLst/>
@@ -1300,7 +1300,7 @@
             <a:fld id="{8BEEBAAA-29B5-4AF5-BC5F-7E580C29002D}" type="datetimeFigureOut">
               <a:rPr lang="en-US" smtClean="0"/>
               <a:pPr/>
-              <a:t>5/12/2020</a:t>
+              <a:t>3/18/2025</a:t>
             </a:fld>
             <a:endParaRPr lang="en-US" dirty="0"/>
           </a:p>
@@ -1318,8 +1318,8 @@
         </p:nvSpPr>
         <p:spPr>
           <a:xfrm>
-            <a:off x="3486150" y="6203953"/>
-            <a:ext cx="2171700" cy="365125"/>
+            <a:off x="4648200" y="6203954"/>
+            <a:ext cx="2895600" cy="365125"/>
           </a:xfrm>
           <a:prstGeom prst="rect">
             <a:avLst/>
@@ -1356,8 +1356,8 @@
         </p:nvSpPr>
         <p:spPr>
           <a:xfrm>
-            <a:off x="6278945" y="6203953"/>
-            <a:ext cx="2457450" cy="365125"/>
+            <a:off x="8371927" y="6203954"/>
+            <a:ext cx="3276600" cy="365125"/>
           </a:xfrm>
           <a:prstGeom prst="rect">
             <a:avLst/>
@@ -1425,8 +1425,8 @@
         </p:nvSpPr>
         <p:spPr>
           <a:xfrm>
-            <a:off x="191214" y="262785"/>
-            <a:ext cx="8762287" cy="6332433"/>
+            <a:off x="254953" y="262786"/>
+            <a:ext cx="11683049" cy="6332433"/>
           </a:xfrm>
           <a:prstGeom prst="rect">
             <a:avLst/>
@@ -1471,8 +1471,8 @@
         </p:nvSpPr>
         <p:spPr bwMode="blackWhite">
           <a:xfrm>
-            <a:off x="191213" y="262785"/>
-            <a:ext cx="8761576" cy="2072643"/>
+            <a:off x="254951" y="262786"/>
+            <a:ext cx="11682101" cy="2072643"/>
           </a:xfrm>
           <a:prstGeom prst="rect">
             <a:avLst/>
@@ -1521,8 +1521,8 @@
         </p:nvSpPr>
         <p:spPr>
           <a:xfrm>
-            <a:off x="390906" y="1536192"/>
-            <a:ext cx="5157216" cy="640080"/>
+            <a:off x="521208" y="1536192"/>
+            <a:ext cx="6876288" cy="640080"/>
           </a:xfrm>
         </p:spPr>
         <p:txBody>
@@ -1559,8 +1559,8 @@
         </p:nvSpPr>
         <p:spPr>
           <a:xfrm>
-            <a:off x="404622" y="2560320"/>
-            <a:ext cx="7084314" cy="3977640"/>
+            <a:off x="539496" y="2560320"/>
+            <a:ext cx="9445752" cy="3977640"/>
           </a:xfrm>
         </p:spPr>
         <p:txBody>
@@ -1756,8 +1756,8 @@
         </p:nvSpPr>
         <p:spPr>
           <a:xfrm>
-            <a:off x="192024" y="265177"/>
-            <a:ext cx="8762287" cy="6332433"/>
+            <a:off x="256033" y="265177"/>
+            <a:ext cx="11683049" cy="6332433"/>
           </a:xfrm>
           <a:prstGeom prst="rect">
             <a:avLst/>
@@ -1806,8 +1806,8 @@
         </p:nvSpPr>
         <p:spPr>
           <a:xfrm>
-            <a:off x="390906" y="448056"/>
-            <a:ext cx="5157216" cy="640080"/>
+            <a:off x="521208" y="448056"/>
+            <a:ext cx="6876288" cy="640080"/>
           </a:xfrm>
           <a:prstGeom prst="rect">
             <a:avLst/>
@@ -1839,8 +1839,8 @@
         </p:nvSpPr>
         <p:spPr>
           <a:xfrm>
-            <a:off x="404622" y="1435608"/>
-            <a:ext cx="3312414" cy="3977640"/>
+            <a:off x="539496" y="1435608"/>
+            <a:ext cx="4416552" cy="3977640"/>
           </a:xfrm>
           <a:prstGeom prst="rect">
             <a:avLst/>
@@ -1901,8 +1901,8 @@
         </p:nvSpPr>
         <p:spPr>
           <a:xfrm>
-            <a:off x="404622" y="6203953"/>
-            <a:ext cx="2457450" cy="365125"/>
+            <a:off x="539496" y="6203954"/>
+            <a:ext cx="3276600" cy="365125"/>
           </a:xfrm>
           <a:prstGeom prst="rect">
             <a:avLst/>
@@ -1926,7 +1926,7 @@
             <a:fld id="{8BEEBAAA-29B5-4AF5-BC5F-7E580C29002D}" type="datetimeFigureOut">
               <a:rPr lang="en-US" smtClean="0"/>
               <a:pPr/>
-              <a:t>5/12/2020</a:t>
+              <a:t>3/18/2025</a:t>
             </a:fld>
             <a:endParaRPr lang="en-US" dirty="0"/>
           </a:p>
@@ -1944,8 +1944,8 @@
         </p:nvSpPr>
         <p:spPr>
           <a:xfrm>
-            <a:off x="3486150" y="6203953"/>
-            <a:ext cx="2171700" cy="365125"/>
+            <a:off x="4648200" y="6203954"/>
+            <a:ext cx="2895600" cy="365125"/>
           </a:xfrm>
           <a:prstGeom prst="rect">
             <a:avLst/>
@@ -1982,8 +1982,8 @@
         </p:nvSpPr>
         <p:spPr>
           <a:xfrm>
-            <a:off x="6281928" y="6203953"/>
-            <a:ext cx="2457450" cy="365125"/>
+            <a:off x="8375904" y="6203954"/>
+            <a:ext cx="3276600" cy="365125"/>
           </a:xfrm>
           <a:prstGeom prst="rect">
             <a:avLst/>
@@ -2021,8 +2021,8 @@
         </p:nvCxnSpPr>
         <p:spPr>
           <a:xfrm>
-            <a:off x="453326" y="1196392"/>
-            <a:ext cx="8237349" cy="0"/>
+            <a:off x="604435" y="1196392"/>
+            <a:ext cx="10983132" cy="0"/>
           </a:xfrm>
           <a:prstGeom prst="line">
             <a:avLst/>
@@ -2394,7 +2394,7 @@
         </p:nvSpPr>
         <p:spPr>
           <a:xfrm>
-            <a:off x="566654" y="1021824"/>
+            <a:off x="2743001" y="1830287"/>
             <a:ext cx="8347702" cy="2387600"/>
           </a:xfrm>
         </p:spPr>
@@ -2457,7 +2457,7 @@
         </p:nvSpPr>
         <p:spPr>
           <a:xfrm>
-            <a:off x="566652" y="3218114"/>
+            <a:off x="2743000" y="4026578"/>
             <a:ext cx="8347703" cy="1137793"/>
           </a:xfrm>
         </p:spPr>
@@ -2481,10 +2481,10 @@
       </p:sp>
       <p:pic>
         <p:nvPicPr>
-          <p:cNvPr id="5" name="Picture 4" descr="A close up of a sign&#10;&#10;Description automatically generated">
+          <p:cNvPr id="6" name="Picture 5" descr="A blue and red rectangular sign with white graphics&#10;&#10;AI-generated content may be incorrect.">
             <a:extLst>
               <a:ext uri="{FF2B5EF4-FFF2-40B4-BE49-F238E27FC236}">
-                <a16:creationId xmlns:a16="http://schemas.microsoft.com/office/drawing/2014/main" id="{9F9FC65E-6492-4ECE-8694-E75EC0093274}"/>
+                <a16:creationId xmlns:a16="http://schemas.microsoft.com/office/drawing/2014/main" id="{877F25F9-D08A-0FBA-2136-5E8B8EA8712F}"/>
               </a:ext>
             </a:extLst>
           </p:cNvPr>
@@ -2494,7 +2494,7 @@
           <p:nvPr/>
         </p:nvPicPr>
         <p:blipFill>
-          <a:blip r:embed="rId3">
+          <a:blip r:embed="rId3" cstate="print">
             <a:extLst>
               <a:ext uri="{28A0092B-C50C-407E-A947-70E740481C1C}">
                 <a14:useLocalDpi xmlns:a14="http://schemas.microsoft.com/office/drawing/2010/main" val="0"/>
@@ -2507,12 +2507,19 @@
         </p:blipFill>
         <p:spPr>
           <a:xfrm>
-            <a:off x="566652" y="4996114"/>
-            <a:ext cx="1219200" cy="1219200"/>
+            <a:off x="1185483" y="2298255"/>
+            <a:ext cx="1176086" cy="1176086"/>
           </a:xfrm>
           <a:prstGeom prst="rect">
             <a:avLst/>
           </a:prstGeom>
+          <a:effectLst>
+            <a:outerShdw blurRad="63500" sx="102000" sy="102000" algn="ctr" rotWithShape="0">
+              <a:prstClr val="black">
+                <a:alpha val="40000"/>
+              </a:prstClr>
+            </a:outerShdw>
+          </a:effectLst>
         </p:spPr>
       </p:pic>
     </p:spTree>
@@ -2545,6 +2552,36 @@
           <a:chExt cx="0" cy="0"/>
         </a:xfrm>
       </p:grpSpPr>
+      <p:pic>
+        <p:nvPicPr>
+          <p:cNvPr id="3" name="Picture 2">
+            <a:extLst>
+              <a:ext uri="{FF2B5EF4-FFF2-40B4-BE49-F238E27FC236}">
+                <a16:creationId xmlns:a16="http://schemas.microsoft.com/office/drawing/2014/main" id="{56FD5FB0-D99E-B427-6DC2-C513FCA104D4}"/>
+              </a:ext>
+            </a:extLst>
+          </p:cNvPr>
+          <p:cNvPicPr>
+            <a:picLocks noChangeAspect="1"/>
+          </p:cNvPicPr>
+          <p:nvPr/>
+        </p:nvPicPr>
+        <p:blipFill>
+          <a:blip r:embed="rId2"/>
+          <a:stretch>
+            <a:fillRect/>
+          </a:stretch>
+        </p:blipFill>
+        <p:spPr>
+          <a:xfrm>
+            <a:off x="2043521" y="1851800"/>
+            <a:ext cx="8104958" cy="4571722"/>
+          </a:xfrm>
+          <a:prstGeom prst="rect">
+            <a:avLst/>
+          </a:prstGeom>
+        </p:spPr>
+      </p:pic>
       <p:sp>
         <p:nvSpPr>
           <p:cNvPr id="8" name="Title 7"/>
@@ -2557,7 +2594,7 @@
         </p:nvSpPr>
         <p:spPr>
           <a:xfrm>
-            <a:off x="415636" y="249381"/>
+            <a:off x="1939636" y="249382"/>
             <a:ext cx="8467108" cy="961901"/>
           </a:xfrm>
         </p:spPr>
@@ -2577,35 +2614,6 @@
           </a:p>
         </p:txBody>
       </p:sp>
-      <p:pic>
-        <p:nvPicPr>
-          <p:cNvPr id="4" name="Picture 3">
-            <a:extLst>
-              <a:ext uri="{FF2B5EF4-FFF2-40B4-BE49-F238E27FC236}">
-                <a16:creationId xmlns:a16="http://schemas.microsoft.com/office/drawing/2014/main" id="{52BE872E-827B-4ED4-8C2C-BEED96C0F732}"/>
-              </a:ext>
-            </a:extLst>
-          </p:cNvPr>
-          <p:cNvPicPr>
-            <a:picLocks noChangeAspect="1"/>
-          </p:cNvPicPr>
-          <p:nvPr/>
-        </p:nvPicPr>
-        <p:blipFill rotWithShape="1">
-          <a:blip r:embed="rId2"/>
-          <a:srcRect t="8002"/>
-          <a:stretch/>
-        </p:blipFill>
-        <p:spPr>
-          <a:xfrm>
-            <a:off x="736269" y="1436914"/>
-            <a:ext cx="7640116" cy="4285646"/>
-          </a:xfrm>
-          <a:prstGeom prst="rect">
-            <a:avLst/>
-          </a:prstGeom>
-        </p:spPr>
-      </p:pic>
       <p:sp>
         <p:nvSpPr>
           <p:cNvPr id="5" name="Oval 4">
@@ -2620,7 +2628,7 @@
         </p:nvSpPr>
         <p:spPr>
           <a:xfrm>
-            <a:off x="1068778" y="1436914"/>
+            <a:off x="4594423" y="2508990"/>
             <a:ext cx="1626919" cy="1626919"/>
           </a:xfrm>
           <a:prstGeom prst="ellipse">
@@ -2672,7 +2680,7 @@
         </p:nvSpPr>
         <p:spPr>
           <a:xfrm>
-            <a:off x="6092041" y="4582530"/>
+            <a:off x="4803018" y="1300709"/>
             <a:ext cx="2585964" cy="461665"/>
           </a:xfrm>
           <a:prstGeom prst="rect">
@@ -2686,7 +2694,7 @@
           </a:bodyPr>
           <a:lstStyle/>
           <a:p>
-            <a:pPr defTabSz="457200">
+            <a:pPr algn="ctr" defTabSz="457200">
               <a:defRPr/>
             </a:pPr>
             <a:r>
@@ -2754,7 +2762,7 @@
         </p:nvSpPr>
         <p:spPr>
           <a:xfrm>
-            <a:off x="415635" y="267934"/>
+            <a:off x="1939636" y="267935"/>
             <a:ext cx="8277103" cy="903327"/>
           </a:xfrm>
         </p:spPr>
@@ -2782,7 +2790,7 @@
                 <a:latin typeface="Segoe UI Light" panose="020B0502040204020203" pitchFamily="34" charset="0"/>
                 <a:cs typeface="Segoe UI Light" panose="020B0502040204020203" pitchFamily="34" charset="0"/>
               </a:rPr>
-              <a:t>switch from PowerPoint slide show to desktop ..</a:t>
+              <a:t>switch from PowerPoint slide show to desktop …</a:t>
             </a:r>
           </a:p>
         </p:txBody>
@@ -2801,7 +2809,7 @@
         </p:nvSpPr>
         <p:spPr>
           <a:xfrm>
-            <a:off x="1120971" y="2747416"/>
+            <a:off x="2644971" y="2747417"/>
             <a:ext cx="1552028" cy="769441"/>
           </a:xfrm>
           <a:prstGeom prst="rect">
@@ -2852,7 +2860,7 @@
         </p:nvSpPr>
         <p:spPr>
           <a:xfrm>
-            <a:off x="2850727" y="2672436"/>
+            <a:off x="4374728" y="2672437"/>
             <a:ext cx="1306235" cy="919401"/>
           </a:xfrm>
           <a:prstGeom prst="roundRect">
@@ -2908,7 +2916,7 @@
         </p:nvSpPr>
         <p:spPr>
           <a:xfrm>
-            <a:off x="6693221" y="2680473"/>
+            <a:off x="8217221" y="2680474"/>
             <a:ext cx="813388" cy="903327"/>
           </a:xfrm>
           <a:prstGeom prst="roundRect">
@@ -2964,7 +2972,7 @@
         </p:nvSpPr>
         <p:spPr>
           <a:xfrm>
-            <a:off x="4702417" y="2672436"/>
+            <a:off x="6226418" y="2672437"/>
             <a:ext cx="1445349" cy="919401"/>
           </a:xfrm>
           <a:prstGeom prst="roundRect">
@@ -3020,7 +3028,7 @@
         </p:nvSpPr>
         <p:spPr>
           <a:xfrm>
-            <a:off x="6060359" y="2747416"/>
+            <a:off x="7584360" y="2747417"/>
             <a:ext cx="720269" cy="769441"/>
           </a:xfrm>
           <a:prstGeom prst="rect">
@@ -3071,7 +3079,7 @@
         </p:nvSpPr>
         <p:spPr>
           <a:xfrm>
-            <a:off x="4069555" y="2747416"/>
+            <a:off x="5593556" y="2747417"/>
             <a:ext cx="720269" cy="769441"/>
           </a:xfrm>
           <a:prstGeom prst="rect">
@@ -3122,7 +3130,7 @@
         </p:nvSpPr>
         <p:spPr>
           <a:xfrm>
-            <a:off x="415634" y="4307393"/>
+            <a:off x="1939635" y="4307394"/>
             <a:ext cx="8277103" cy="1200329"/>
           </a:xfrm>
           <a:prstGeom prst="rect">
@@ -3147,7 +3155,7 @@
                 <a:latin typeface="Calibri" panose="020F0502020204030204"/>
                 <a:ea typeface="游ゴシック" panose="020B0400000000000000" pitchFamily="50" charset="-128"/>
               </a:rPr>
-              <a:t>The "Switch from slideshow to desktop" app toggles hiding or showing the PowerPoint slideshow window each time you type that key combination.</a:t>
+              <a:t>The "Switch to Desktop from Slide show" app toggles hiding or showing the PowerPoint slideshow window each time you type that key combination.</a:t>
             </a:r>
             <a:endParaRPr kumimoji="1" lang="ja-JP" altLang="en-US" sz="2400" kern="0" dirty="0">
               <a:solidFill>
@@ -3878,7 +3886,7 @@
         <p:spPr/>
         <p:txBody>
           <a:bodyPr>
-            <a:normAutofit fontScale="90000"/>
+            <a:normAutofit/>
           </a:bodyPr>
           <a:lstStyle/>
           <a:p>
@@ -3900,7 +3908,7 @@
         </p:nvSpPr>
         <p:spPr>
           <a:xfrm>
-            <a:off x="7710349" y="5904388"/>
+            <a:off x="10511164" y="5709242"/>
             <a:ext cx="1053494" cy="646331"/>
           </a:xfrm>
           <a:prstGeom prst="rect">

</xml_diff>

<commit_message>
Update the application icon again
</commit_message>
<xml_diff>
--- a/.assets/Welcome.pptx
+++ b/.assets/Welcome.pptx
@@ -243,7 +243,7 @@
           <a:p>
             <a:fld id="{80680FBE-A8DF-4758-9AC4-3A9E1039168F}" type="datetimeFigureOut">
               <a:rPr lang="en-US" smtClean="0"/>
-              <a:t>3/18/2025</a:t>
+              <a:t>3/20/2025</a:t>
             </a:fld>
             <a:endParaRPr lang="en-US"/>
           </a:p>
@@ -408,7 +408,7 @@
           <a:p>
             <a:fld id="{EC13577B-6902-467D-A26C-08A0DD5E4E03}" type="datetimeFigureOut">
               <a:rPr lang="en-US" smtClean="0"/>
-              <a:t>3/18/2025</a:t>
+              <a:t>3/20/2025</a:t>
             </a:fld>
             <a:endParaRPr lang="en-US"/>
           </a:p>
@@ -1300,7 +1300,7 @@
             <a:fld id="{8BEEBAAA-29B5-4AF5-BC5F-7E580C29002D}" type="datetimeFigureOut">
               <a:rPr lang="en-US" smtClean="0"/>
               <a:pPr/>
-              <a:t>3/18/2025</a:t>
+              <a:t>3/20/2025</a:t>
             </a:fld>
             <a:endParaRPr lang="en-US" dirty="0"/>
           </a:p>
@@ -1926,7 +1926,7 @@
             <a:fld id="{8BEEBAAA-29B5-4AF5-BC5F-7E580C29002D}" type="datetimeFigureOut">
               <a:rPr lang="en-US" smtClean="0"/>
               <a:pPr/>
-              <a:t>3/18/2025</a:t>
+              <a:t>3/20/2025</a:t>
             </a:fld>
             <a:endParaRPr lang="en-US" dirty="0"/>
           </a:p>
@@ -2382,6 +2382,49 @@
           <a:chExt cx="0" cy="0"/>
         </a:xfrm>
       </p:grpSpPr>
+      <p:pic>
+        <p:nvPicPr>
+          <p:cNvPr id="5" name="Picture 4" descr="A red and blue sign with white letters&#10;&#10;AI-generated content may be incorrect.">
+            <a:extLst>
+              <a:ext uri="{FF2B5EF4-FFF2-40B4-BE49-F238E27FC236}">
+                <a16:creationId xmlns:a16="http://schemas.microsoft.com/office/drawing/2014/main" id="{BE603391-5088-D56D-7165-D30ED803ADEC}"/>
+              </a:ext>
+            </a:extLst>
+          </p:cNvPr>
+          <p:cNvPicPr>
+            <a:picLocks noChangeAspect="1"/>
+          </p:cNvPicPr>
+          <p:nvPr/>
+        </p:nvPicPr>
+        <p:blipFill>
+          <a:blip r:embed="rId3" cstate="print">
+            <a:extLst>
+              <a:ext uri="{28A0092B-C50C-407E-A947-70E740481C1C}">
+                <a14:useLocalDpi xmlns:a14="http://schemas.microsoft.com/office/drawing/2010/main" val="0"/>
+              </a:ext>
+            </a:extLst>
+          </a:blip>
+          <a:stretch>
+            <a:fillRect/>
+          </a:stretch>
+        </p:blipFill>
+        <p:spPr>
+          <a:xfrm>
+            <a:off x="1185482" y="2298255"/>
+            <a:ext cx="1176086" cy="1176086"/>
+          </a:xfrm>
+          <a:prstGeom prst="rect">
+            <a:avLst/>
+          </a:prstGeom>
+          <a:effectLst>
+            <a:outerShdw blurRad="63500" sx="102000" sy="102000" algn="ctr" rotWithShape="0">
+              <a:prstClr val="black">
+                <a:alpha val="40000"/>
+              </a:prstClr>
+            </a:outerShdw>
+          </a:effectLst>
+        </p:spPr>
+      </p:pic>
       <p:sp>
         <p:nvSpPr>
           <p:cNvPr id="2" name="Title 1"/>
@@ -2479,49 +2522,6 @@
           </a:p>
         </p:txBody>
       </p:sp>
-      <p:pic>
-        <p:nvPicPr>
-          <p:cNvPr id="6" name="Picture 5" descr="A blue and red rectangular sign with white graphics&#10;&#10;AI-generated content may be incorrect.">
-            <a:extLst>
-              <a:ext uri="{FF2B5EF4-FFF2-40B4-BE49-F238E27FC236}">
-                <a16:creationId xmlns:a16="http://schemas.microsoft.com/office/drawing/2014/main" id="{877F25F9-D08A-0FBA-2136-5E8B8EA8712F}"/>
-              </a:ext>
-            </a:extLst>
-          </p:cNvPr>
-          <p:cNvPicPr>
-            <a:picLocks noChangeAspect="1"/>
-          </p:cNvPicPr>
-          <p:nvPr/>
-        </p:nvPicPr>
-        <p:blipFill>
-          <a:blip r:embed="rId3" cstate="print">
-            <a:extLst>
-              <a:ext uri="{28A0092B-C50C-407E-A947-70E740481C1C}">
-                <a14:useLocalDpi xmlns:a14="http://schemas.microsoft.com/office/drawing/2010/main" val="0"/>
-              </a:ext>
-            </a:extLst>
-          </a:blip>
-          <a:stretch>
-            <a:fillRect/>
-          </a:stretch>
-        </p:blipFill>
-        <p:spPr>
-          <a:xfrm>
-            <a:off x="1185483" y="2298255"/>
-            <a:ext cx="1176086" cy="1176086"/>
-          </a:xfrm>
-          <a:prstGeom prst="rect">
-            <a:avLst/>
-          </a:prstGeom>
-          <a:effectLst>
-            <a:outerShdw blurRad="63500" sx="102000" sy="102000" algn="ctr" rotWithShape="0">
-              <a:prstClr val="black">
-                <a:alpha val="40000"/>
-              </a:prstClr>
-            </a:outerShdw>
-          </a:effectLst>
-        </p:spPr>
-      </p:pic>
     </p:spTree>
     <p:extLst>
       <p:ext uri="{BB962C8B-B14F-4D97-AF65-F5344CB8AC3E}">
@@ -2554,10 +2554,10 @@
       </p:grpSpPr>
       <p:pic>
         <p:nvPicPr>
-          <p:cNvPr id="3" name="Picture 2">
+          <p:cNvPr id="4" name="Picture 3" descr="A screenshot of a computer">
             <a:extLst>
               <a:ext uri="{FF2B5EF4-FFF2-40B4-BE49-F238E27FC236}">
-                <a16:creationId xmlns:a16="http://schemas.microsoft.com/office/drawing/2014/main" id="{56FD5FB0-D99E-B427-6DC2-C513FCA104D4}"/>
+                <a16:creationId xmlns:a16="http://schemas.microsoft.com/office/drawing/2014/main" id="{AB73DDDF-EC88-74FD-E881-84AECA9B5F1F}"/>
               </a:ext>
             </a:extLst>
           </p:cNvPr>
@@ -2567,15 +2567,21 @@
           <p:nvPr/>
         </p:nvPicPr>
         <p:blipFill>
-          <a:blip r:embed="rId2"/>
+          <a:blip r:embed="rId2" cstate="print">
+            <a:extLst>
+              <a:ext uri="{28A0092B-C50C-407E-A947-70E740481C1C}">
+                <a14:useLocalDpi xmlns:a14="http://schemas.microsoft.com/office/drawing/2010/main" val="0"/>
+              </a:ext>
+            </a:extLst>
+          </a:blip>
           <a:stretch>
             <a:fillRect/>
           </a:stretch>
         </p:blipFill>
         <p:spPr>
           <a:xfrm>
-            <a:off x="2043521" y="1851800"/>
-            <a:ext cx="8104958" cy="4571722"/>
+            <a:off x="2063796" y="1851799"/>
+            <a:ext cx="8064409" cy="4615907"/>
           </a:xfrm>
           <a:prstGeom prst="rect">
             <a:avLst/>
@@ -2628,7 +2634,7 @@
         </p:nvSpPr>
         <p:spPr>
           <a:xfrm>
-            <a:off x="4594423" y="2508990"/>
+            <a:off x="4744965" y="2386322"/>
             <a:ext cx="1626919" cy="1626919"/>
           </a:xfrm>
           <a:prstGeom prst="ellipse">
@@ -2714,6 +2720,58 @@
               <a:latin typeface="Calibri" panose="020F0502020204030204"/>
               <a:ea typeface="游ゴシック" panose="020B0400000000000000" pitchFamily="50" charset="-128"/>
             </a:endParaRPr>
+          </a:p>
+        </p:txBody>
+      </p:sp>
+      <p:sp>
+        <p:nvSpPr>
+          <p:cNvPr id="6" name="Oval 5">
+            <a:extLst>
+              <a:ext uri="{FF2B5EF4-FFF2-40B4-BE49-F238E27FC236}">
+                <a16:creationId xmlns:a16="http://schemas.microsoft.com/office/drawing/2014/main" id="{BA72267E-531E-7149-3B77-930D8AF85BDF}"/>
+              </a:ext>
+            </a:extLst>
+          </p:cNvPr>
+          <p:cNvSpPr/>
+          <p:nvPr/>
+        </p:nvSpPr>
+        <p:spPr>
+          <a:xfrm>
+            <a:off x="8686800" y="6007490"/>
+            <a:ext cx="684762" cy="684762"/>
+          </a:xfrm>
+          <a:prstGeom prst="ellipse">
+            <a:avLst/>
+          </a:prstGeom>
+          <a:noFill/>
+          <a:ln w="76200">
+            <a:solidFill>
+              <a:srgbClr val="FF9B45"/>
+            </a:solidFill>
+          </a:ln>
+        </p:spPr>
+        <p:style>
+          <a:lnRef idx="2">
+            <a:schemeClr val="accent1">
+              <a:shade val="50000"/>
+            </a:schemeClr>
+          </a:lnRef>
+          <a:fillRef idx="1">
+            <a:schemeClr val="accent1"/>
+          </a:fillRef>
+          <a:effectRef idx="0">
+            <a:schemeClr val="accent1"/>
+          </a:effectRef>
+          <a:fontRef idx="minor">
+            <a:schemeClr val="lt1"/>
+          </a:fontRef>
+        </p:style>
+        <p:txBody>
+          <a:bodyPr rtlCol="0" anchor="ctr"/>
+          <a:lstStyle/>
+          <a:p>
+            <a:pPr algn="ctr"/>
+            <a:endParaRPr lang="en-US"/>
           </a:p>
         </p:txBody>
       </p:sp>

</xml_diff>